<commit_message>
Material de apoio - MongoDB e JWT
</commit_message>
<xml_diff>
--- a/#00 - Material de Apoio/8 - Desafio 3 MongoDB/PPTs/01 - Desafio 3 MongoDB.pptx
+++ b/#00 - Material de Apoio/8 - Desafio 3 MongoDB/PPTs/01 - Desafio 3 MongoDB.pptx
@@ -212,7 +212,7 @@
           <a:p>
             <a:fld id="{139EEEC3-02C9-4141-B0CF-4C776CBE4D81}" type="datetimeFigureOut">
               <a:rPr lang="pt-BR" smtClean="0"/>
-              <a:t>01/02/2021</a:t>
+              <a:t>05/02/2021</a:t>
             </a:fld>
             <a:endParaRPr lang="pt-BR"/>
           </a:p>
@@ -1291,7 +1291,7 @@
           <a:p>
             <a:fld id="{1D8BD707-D9CF-40AE-B4C6-C98DA3205C09}" type="datetimeFigureOut">
               <a:rPr lang="en-US"/>
-              <a:t>2/1/2021</a:t>
+              <a:t>2/5/2021</a:t>
             </a:fld>
             <a:endParaRPr lang="en-US"/>
           </a:p>
@@ -1462,7 +1462,7 @@
           <a:p>
             <a:fld id="{1D8BD707-D9CF-40AE-B4C6-C98DA3205C09}" type="datetimeFigureOut">
               <a:rPr lang="en-US"/>
-              <a:t>2/1/2021</a:t>
+              <a:t>2/5/2021</a:t>
             </a:fld>
             <a:endParaRPr lang="en-US"/>
           </a:p>
@@ -1676,7 +1676,7 @@
           <a:p>
             <a:fld id="{1D8BD707-D9CF-40AE-B4C6-C98DA3205C09}" type="datetimeFigureOut">
               <a:rPr lang="en-US"/>
-              <a:t>2/1/2021</a:t>
+              <a:t>2/5/2021</a:t>
             </a:fld>
             <a:endParaRPr lang="en-US"/>
           </a:p>
@@ -1919,7 +1919,7 @@
           <a:p>
             <a:fld id="{1D8BD707-D9CF-40AE-B4C6-C98DA3205C09}" type="datetimeFigureOut">
               <a:rPr lang="en-US"/>
-              <a:t>2/1/2021</a:t>
+              <a:t>2/5/2021</a:t>
             </a:fld>
             <a:endParaRPr lang="en-US"/>
           </a:p>
@@ -2038,7 +2038,7 @@
           <a:p>
             <a:fld id="{1D8BD707-D9CF-40AE-B4C6-C98DA3205C09}" type="datetimeFigureOut">
               <a:rPr lang="en-US"/>
-              <a:t>2/1/2021</a:t>
+              <a:t>2/5/2021</a:t>
             </a:fld>
             <a:endParaRPr lang="en-US"/>
           </a:p>
@@ -2373,7 +2373,7 @@
           <a:p>
             <a:fld id="{1D8BD707-D9CF-40AE-B4C6-C98DA3205C09}" type="datetimeFigureOut">
               <a:rPr lang="en-US"/>
-              <a:t>2/1/2021</a:t>
+              <a:t>2/5/2021</a:t>
             </a:fld>
             <a:endParaRPr lang="en-US"/>
           </a:p>
@@ -2796,7 +2796,17 @@
                 <a:latin typeface="Arial"/>
                 <a:cs typeface="Arial"/>
               </a:rPr>
-              <a:t>Desafio 2</a:t>
+              <a:t>Desafio </a:t>
+            </a:r>
+            <a:r>
+              <a:rPr lang="pt-BR" sz="6050" b="1" spc="180" dirty="0" smtClean="0">
+                <a:solidFill>
+                  <a:srgbClr val="69EB00"/>
+                </a:solidFill>
+                <a:latin typeface="Arial"/>
+                <a:cs typeface="Arial"/>
+              </a:rPr>
+              <a:t>3</a:t>
             </a:r>
             <a:r>
               <a:rPr sz="6050" b="1" spc="-430" dirty="0" smtClean="0">
@@ -3064,7 +3074,17 @@
                 <a:latin typeface="Arial"/>
                 <a:cs typeface="Arial"/>
               </a:rPr>
-              <a:t>Desafio 2 </a:t>
+              <a:t>Desafio </a:t>
+            </a:r>
+            <a:r>
+              <a:rPr lang="pt-BR" sz="6050" b="1" kern="0" spc="270" dirty="0" smtClean="0">
+                <a:solidFill>
+                  <a:srgbClr val="69EB00"/>
+                </a:solidFill>
+                <a:latin typeface="Arial"/>
+                <a:cs typeface="Arial"/>
+              </a:rPr>
+              <a:t>3 </a:t>
             </a:r>
             <a:r>
               <a:rPr lang="pt-BR" sz="6050" b="1" spc="345" dirty="0" err="1">
@@ -3598,7 +3618,17 @@
                 <a:latin typeface="Arial"/>
                 <a:cs typeface="Arial"/>
               </a:rPr>
-              <a:t>Desafio 2 </a:t>
+              <a:t>Desafio </a:t>
+            </a:r>
+            <a:r>
+              <a:rPr lang="pt-BR" sz="6050" b="1" kern="0" spc="270" dirty="0" smtClean="0">
+                <a:solidFill>
+                  <a:srgbClr val="69EB00"/>
+                </a:solidFill>
+                <a:latin typeface="Arial"/>
+                <a:cs typeface="Arial"/>
+              </a:rPr>
+              <a:t>3 </a:t>
             </a:r>
             <a:r>
               <a:rPr lang="pt-BR" sz="6050" b="1" spc="345" dirty="0" err="1">
@@ -4004,7 +4034,17 @@
                 <a:latin typeface="Arial"/>
                 <a:cs typeface="Arial"/>
               </a:rPr>
-              <a:t>Desafio 2 </a:t>
+              <a:t>Desafio </a:t>
+            </a:r>
+            <a:r>
+              <a:rPr lang="pt-BR" sz="6050" b="1" kern="0" spc="270" dirty="0" smtClean="0">
+                <a:solidFill>
+                  <a:srgbClr val="69EB00"/>
+                </a:solidFill>
+                <a:latin typeface="Arial"/>
+                <a:cs typeface="Arial"/>
+              </a:rPr>
+              <a:t>3 </a:t>
             </a:r>
             <a:r>
               <a:rPr lang="pt-BR" sz="6050" b="1" spc="345" dirty="0" err="1">
@@ -4410,7 +4450,17 @@
                 <a:latin typeface="Arial"/>
                 <a:cs typeface="Arial"/>
               </a:rPr>
-              <a:t>Desafio 2 </a:t>
+              <a:t>Desafio </a:t>
+            </a:r>
+            <a:r>
+              <a:rPr lang="pt-BR" sz="6050" b="1" kern="0" spc="270" dirty="0" smtClean="0">
+                <a:solidFill>
+                  <a:srgbClr val="69EB00"/>
+                </a:solidFill>
+                <a:latin typeface="Arial"/>
+                <a:cs typeface="Arial"/>
+              </a:rPr>
+              <a:t>3 </a:t>
             </a:r>
             <a:r>
               <a:rPr lang="pt-BR" sz="6050" b="1" spc="345" dirty="0" err="1">
@@ -4880,7 +4930,17 @@
                 <a:latin typeface="Arial"/>
                 <a:cs typeface="Arial"/>
               </a:rPr>
-              <a:t>Desafio 2 </a:t>
+              <a:t>Desafio </a:t>
+            </a:r>
+            <a:r>
+              <a:rPr lang="pt-BR" sz="6050" b="1" kern="0" spc="270" dirty="0" smtClean="0">
+                <a:solidFill>
+                  <a:srgbClr val="69EB00"/>
+                </a:solidFill>
+                <a:latin typeface="Arial"/>
+                <a:cs typeface="Arial"/>
+              </a:rPr>
+              <a:t>3 </a:t>
             </a:r>
             <a:r>
               <a:rPr lang="pt-BR" sz="6050" b="1" spc="345" dirty="0" err="1">
@@ -5266,7 +5326,17 @@
                 <a:latin typeface="Arial"/>
                 <a:cs typeface="Arial"/>
               </a:rPr>
-              <a:t>Desafio 2 </a:t>
+              <a:t>Desafio </a:t>
+            </a:r>
+            <a:r>
+              <a:rPr lang="pt-BR" sz="6050" b="1" kern="0" spc="270" dirty="0" smtClean="0">
+                <a:solidFill>
+                  <a:srgbClr val="69EB00"/>
+                </a:solidFill>
+                <a:latin typeface="Arial"/>
+                <a:cs typeface="Arial"/>
+              </a:rPr>
+              <a:t>3 </a:t>
             </a:r>
             <a:r>
               <a:rPr lang="pt-BR" sz="6050" b="1" spc="345" dirty="0" err="1">
@@ -5652,7 +5722,17 @@
                 <a:latin typeface="Arial"/>
                 <a:cs typeface="Arial"/>
               </a:rPr>
-              <a:t>Desafio 2 </a:t>
+              <a:t>Desafio </a:t>
+            </a:r>
+            <a:r>
+              <a:rPr lang="pt-BR" sz="6050" b="1" kern="0" spc="270" dirty="0" smtClean="0">
+                <a:solidFill>
+                  <a:srgbClr val="69EB00"/>
+                </a:solidFill>
+                <a:latin typeface="Arial"/>
+                <a:cs typeface="Arial"/>
+              </a:rPr>
+              <a:t>3 </a:t>
             </a:r>
             <a:r>
               <a:rPr lang="pt-BR" sz="6050" b="1" spc="345" dirty="0" err="1">
@@ -6038,7 +6118,17 @@
                 <a:latin typeface="Arial"/>
                 <a:cs typeface="Arial"/>
               </a:rPr>
-              <a:t>Desafio 2 </a:t>
+              <a:t>Desafio </a:t>
+            </a:r>
+            <a:r>
+              <a:rPr lang="pt-BR" sz="6050" b="1" kern="0" spc="270" dirty="0" smtClean="0">
+                <a:solidFill>
+                  <a:srgbClr val="69EB00"/>
+                </a:solidFill>
+                <a:latin typeface="Arial"/>
+                <a:cs typeface="Arial"/>
+              </a:rPr>
+              <a:t>3 </a:t>
             </a:r>
             <a:r>
               <a:rPr lang="pt-BR" sz="6050" b="1" spc="345" dirty="0" err="1">
@@ -6424,7 +6514,17 @@
                 <a:latin typeface="Arial"/>
                 <a:cs typeface="Arial"/>
               </a:rPr>
-              <a:t>Desafio 2 </a:t>
+              <a:t>Desafio </a:t>
+            </a:r>
+            <a:r>
+              <a:rPr lang="pt-BR" sz="6050" b="1" kern="0" spc="270" dirty="0" smtClean="0">
+                <a:solidFill>
+                  <a:srgbClr val="69EB00"/>
+                </a:solidFill>
+                <a:latin typeface="Arial"/>
+                <a:cs typeface="Arial"/>
+              </a:rPr>
+              <a:t>3 </a:t>
             </a:r>
             <a:r>
               <a:rPr lang="pt-BR" sz="6050" b="1" spc="345" dirty="0" err="1">
@@ -6810,7 +6910,17 @@
                 <a:latin typeface="Arial"/>
                 <a:cs typeface="Arial"/>
               </a:rPr>
-              <a:t>Desafio 2 </a:t>
+              <a:t>Desafio </a:t>
+            </a:r>
+            <a:r>
+              <a:rPr lang="pt-BR" sz="6050" b="1" kern="0" spc="270" dirty="0" smtClean="0">
+                <a:solidFill>
+                  <a:srgbClr val="69EB00"/>
+                </a:solidFill>
+                <a:latin typeface="Arial"/>
+                <a:cs typeface="Arial"/>
+              </a:rPr>
+              <a:t>3 </a:t>
             </a:r>
             <a:r>
               <a:rPr lang="pt-BR" sz="6050" b="1" spc="345" dirty="0" err="1">
@@ -7196,7 +7306,17 @@
                 <a:latin typeface="Arial"/>
                 <a:cs typeface="Arial"/>
               </a:rPr>
-              <a:t>Desafio 2 </a:t>
+              <a:t>Desafio </a:t>
+            </a:r>
+            <a:r>
+              <a:rPr lang="pt-BR" sz="6050" b="1" kern="0" spc="270" dirty="0" smtClean="0">
+                <a:solidFill>
+                  <a:srgbClr val="69EB00"/>
+                </a:solidFill>
+                <a:latin typeface="Arial"/>
+                <a:cs typeface="Arial"/>
+              </a:rPr>
+              <a:t>3 </a:t>
             </a:r>
             <a:r>
               <a:rPr lang="pt-BR" sz="6050" b="1" spc="345" dirty="0" err="1">
@@ -7366,17 +7486,7 @@
                 <a:latin typeface="Arial"/>
                 <a:cs typeface="Arial"/>
               </a:rPr>
-              <a:t>Nela iremos mudar sua leitura e grav</a:t>
-            </a:r>
-            <a:r>
-              <a:rPr lang="pt-BR" sz="4000" b="1" kern="0" spc="180" dirty="0" smtClean="0">
-                <a:solidFill>
-                  <a:schemeClr val="tx1"/>
-                </a:solidFill>
-                <a:latin typeface="Arial"/>
-                <a:cs typeface="Arial"/>
-              </a:rPr>
-              <a:t>ação de uma base de dados relacional para uma não relacional.</a:t>
+              <a:t>Nela iremos mudar sua leitura e gravação de uma base de dados relacional para uma não relacional.</a:t>
             </a:r>
           </a:p>
           <a:p>
@@ -7456,13 +7566,6 @@
               </a:rPr>
               <a:t>.</a:t>
             </a:r>
-            <a:endParaRPr lang="pt-BR" sz="4000" b="1" kern="0" spc="180" dirty="0" smtClean="0">
-              <a:solidFill>
-                <a:schemeClr val="tx1"/>
-              </a:solidFill>
-              <a:latin typeface="Arial"/>
-              <a:cs typeface="Arial"/>
-            </a:endParaRPr>
           </a:p>
         </p:txBody>
       </p:sp>
@@ -7708,7 +7811,17 @@
                 <a:latin typeface="Arial"/>
                 <a:cs typeface="Arial"/>
               </a:rPr>
-              <a:t>Desafio 2 </a:t>
+              <a:t>Desafio </a:t>
+            </a:r>
+            <a:r>
+              <a:rPr lang="pt-BR" sz="6050" b="1" kern="0" spc="270" dirty="0" smtClean="0">
+                <a:solidFill>
+                  <a:srgbClr val="69EB00"/>
+                </a:solidFill>
+                <a:latin typeface="Arial"/>
+                <a:cs typeface="Arial"/>
+              </a:rPr>
+              <a:t>3 </a:t>
             </a:r>
             <a:r>
               <a:rPr lang="pt-BR" sz="6050" b="1" spc="345" dirty="0" err="1">
@@ -8167,7 +8280,17 @@
                 <a:latin typeface="Arial"/>
                 <a:cs typeface="Arial"/>
               </a:rPr>
-              <a:t>Desafio 2 </a:t>
+              <a:t>Desafio </a:t>
+            </a:r>
+            <a:r>
+              <a:rPr lang="pt-BR" sz="6050" b="1" kern="0" spc="270" dirty="0" smtClean="0">
+                <a:solidFill>
+                  <a:srgbClr val="69EB00"/>
+                </a:solidFill>
+                <a:latin typeface="Arial"/>
+                <a:cs typeface="Arial"/>
+              </a:rPr>
+              <a:t>3 </a:t>
             </a:r>
             <a:r>
               <a:rPr lang="pt-BR" sz="6050" b="1" spc="345" dirty="0" err="1">
@@ -8398,13 +8521,6 @@
               </a:rPr>
               <a:t>Em seguida iremos substituir nosso repositório.</a:t>
             </a:r>
-            <a:endParaRPr lang="pt-BR" sz="4000" b="1" kern="0" spc="180" dirty="0" smtClean="0">
-              <a:solidFill>
-                <a:schemeClr val="tx1"/>
-              </a:solidFill>
-              <a:latin typeface="Arial"/>
-              <a:cs typeface="Arial"/>
-            </a:endParaRPr>
           </a:p>
         </p:txBody>
       </p:sp>
@@ -8655,7 +8771,17 @@
                 <a:latin typeface="Arial"/>
                 <a:cs typeface="Arial"/>
               </a:rPr>
-              <a:t>Desafio 2 </a:t>
+              <a:t>Desafio </a:t>
+            </a:r>
+            <a:r>
+              <a:rPr lang="pt-BR" sz="6050" b="1" kern="0" spc="270" dirty="0" smtClean="0">
+                <a:solidFill>
+                  <a:srgbClr val="69EB00"/>
+                </a:solidFill>
+                <a:latin typeface="Arial"/>
+                <a:cs typeface="Arial"/>
+              </a:rPr>
+              <a:t>3 </a:t>
             </a:r>
             <a:r>
               <a:rPr lang="pt-BR" sz="6050" b="1" spc="345" dirty="0" err="1">
@@ -9158,7 +9284,17 @@
                 <a:latin typeface="Arial"/>
                 <a:cs typeface="Arial"/>
               </a:rPr>
-              <a:t>Desafio 2 </a:t>
+              <a:t>Desafio </a:t>
+            </a:r>
+            <a:r>
+              <a:rPr lang="pt-BR" sz="6050" b="1" kern="0" spc="270" dirty="0" smtClean="0">
+                <a:solidFill>
+                  <a:srgbClr val="69EB00"/>
+                </a:solidFill>
+                <a:latin typeface="Arial"/>
+                <a:cs typeface="Arial"/>
+              </a:rPr>
+              <a:t>3 </a:t>
             </a:r>
             <a:r>
               <a:rPr lang="pt-BR" sz="6050" b="1" spc="345" dirty="0" err="1">
@@ -9681,7 +9817,17 @@
                 <a:latin typeface="Arial"/>
                 <a:cs typeface="Arial"/>
               </a:rPr>
-              <a:t>Desafio 2 </a:t>
+              <a:t>Desafio </a:t>
+            </a:r>
+            <a:r>
+              <a:rPr lang="pt-BR" sz="6050" b="1" kern="0" spc="270" dirty="0" smtClean="0">
+                <a:solidFill>
+                  <a:srgbClr val="69EB00"/>
+                </a:solidFill>
+                <a:latin typeface="Arial"/>
+                <a:cs typeface="Arial"/>
+              </a:rPr>
+              <a:t>3 </a:t>
             </a:r>
             <a:r>
               <a:rPr lang="pt-BR" sz="6050" b="1" spc="345" dirty="0" err="1">
@@ -10081,7 +10227,17 @@
                 <a:latin typeface="Arial"/>
                 <a:cs typeface="Arial"/>
               </a:rPr>
-              <a:t>Desafio 2 </a:t>
+              <a:t>Desafio </a:t>
+            </a:r>
+            <a:r>
+              <a:rPr lang="pt-BR" sz="6050" b="1" kern="0" spc="270" dirty="0" smtClean="0">
+                <a:solidFill>
+                  <a:srgbClr val="69EB00"/>
+                </a:solidFill>
+                <a:latin typeface="Arial"/>
+                <a:cs typeface="Arial"/>
+              </a:rPr>
+              <a:t>3 </a:t>
             </a:r>
             <a:r>
               <a:rPr lang="pt-BR" sz="6050" b="1" spc="345" dirty="0" err="1">
@@ -10540,7 +10696,17 @@
                 <a:latin typeface="Arial"/>
                 <a:cs typeface="Arial"/>
               </a:rPr>
-              <a:t>Desafio 2 </a:t>
+              <a:t>Desafio </a:t>
+            </a:r>
+            <a:r>
+              <a:rPr lang="pt-BR" sz="6050" b="1" kern="0" spc="270" dirty="0" smtClean="0">
+                <a:solidFill>
+                  <a:srgbClr val="69EB00"/>
+                </a:solidFill>
+                <a:latin typeface="Arial"/>
+                <a:cs typeface="Arial"/>
+              </a:rPr>
+              <a:t>3 </a:t>
             </a:r>
             <a:r>
               <a:rPr lang="pt-BR" sz="6050" b="1" spc="345" dirty="0" err="1">
@@ -10867,7 +11033,17 @@
                 <a:latin typeface="Arial"/>
                 <a:cs typeface="Arial"/>
               </a:rPr>
-              <a:t>Desafio 2 </a:t>
+              <a:t>Desafio </a:t>
+            </a:r>
+            <a:r>
+              <a:rPr lang="pt-BR" sz="6050" b="1" kern="0" spc="270" dirty="0" smtClean="0">
+                <a:solidFill>
+                  <a:srgbClr val="69EB00"/>
+                </a:solidFill>
+                <a:latin typeface="Arial"/>
+                <a:cs typeface="Arial"/>
+              </a:rPr>
+              <a:t>3 </a:t>
             </a:r>
             <a:r>
               <a:rPr lang="pt-BR" sz="6050" b="1" spc="345" dirty="0" err="1">

</xml_diff>